<commit_message>
Fixed bug in JS files: assigning data to global variable didn't work and I was tricked by cached page. Updated slideshow. Added 'Previous' link to outro.html to go back to page10.html. Fixed bug in app10.js: broken link to outro.html.
</commit_message>
<xml_diff>
--- a/BarChart Slideshow 2.pptx
+++ b/BarChart Slideshow 2.pptx
@@ -10275,7 +10275,7 @@
         <p:spPr bwMode="auto"/>
         <p:txBody>
           <a:bodyPr vertOverflow="overflow" horzOverflow="clip" vert="horz" wrap="square" lIns="91440" tIns="45720" rIns="91440" bIns="45720" numCol="1" spcCol="0" rtlCol="0" fromWordArt="0" anchor="t" anchorCtr="0" forceAA="0" upright="0" compatLnSpc="0">
-            <a:normAutofit fontScale="95000" lnSpcReduction="1000"/>
+            <a:normAutofit fontScale="85000" lnSpcReduction="3000"/>
           </a:bodyPr>
           <a:lstStyle/>
           <a:p>
@@ -10284,7 +10284,7 @@
             </a:pPr>
             <a:r>
               <a:rPr/>
-              <a:t>To fetch some data (several formats supported), queue request(s) for asynchronous retrieval into global variable birthData:</a:t>
+              <a:t>To fetch some data (several formats supported), queue request(s) for asynchronous retrieval into global new variable birthDataJSON:</a:t>
             </a:r>
             <a:endParaRPr/>
           </a:p>
@@ -10571,6 +10571,32 @@
                 <a:cs typeface="Andale Mono"/>
               </a:rPr>
               <a:t> error;</a:t>
+            </a:r>
+            <a:endParaRPr lang="en-US" sz="2500" b="0" i="0" u="none" strike="noStrike" cap="none" spc="0">
+              <a:solidFill>
+                <a:schemeClr val="tx1"/>
+              </a:solidFill>
+              <a:latin typeface="Andale Mono"/>
+              <a:ea typeface="Andale Mono"/>
+              <a:cs typeface="Andale Mono"/>
+            </a:endParaRPr>
+          </a:p>
+          <a:p>
+            <a:pPr marL="0" indent="0">
+              <a:buFont typeface="Arial"/>
+              <a:buNone/>
+              <a:defRPr/>
+            </a:pPr>
+            <a:r>
+              <a:rPr lang="en-US" sz="2500" b="0" i="0" u="none" strike="noStrike" cap="none" spc="0">
+                <a:solidFill>
+                  <a:schemeClr val="tx1"/>
+                </a:solidFill>
+                <a:latin typeface="Andale Mono"/>
+                <a:ea typeface="Andale Mono"/>
+                <a:cs typeface="Andale Mono"/>
+              </a:rPr>
+              <a:t>		birthData = birthDataJSON; // assign to global var</a:t>
             </a:r>
             <a:br>
               <a:rPr lang="en-US" sz="2500" b="0" i="0" u="none" strike="noStrike" cap="none" spc="0">

</xml_diff>